<commit_message>
let's get these onlie
</commit_message>
<xml_diff>
--- a/scaffold/old/talk_feb_2.pptx
+++ b/scaffold/old/talk_feb_2.pptx
@@ -216,7 +216,7 @@
           <a:p>
             <a:fld id="{1B8AC848-6CEE-0744-AFE6-E0701C96A024}" type="datetimeFigureOut">
               <a:rPr lang="en-US" smtClean="0"/>
-              <a:t>2/2/21</a:t>
+              <a:t>2/11/21</a:t>
             </a:fld>
             <a:endParaRPr lang="en-US"/>
           </a:p>
@@ -776,6 +776,196 @@
 </p:notes>
 </file>
 
+<file path=ppt/notesSlides/notesSlide4.xml><?xml version="1.0" encoding="utf-8"?>
+<p:notes xmlns:a="http://schemas.openxmlformats.org/drawingml/2006/main" xmlns:r="http://schemas.openxmlformats.org/officeDocument/2006/relationships" xmlns:p="http://schemas.openxmlformats.org/presentationml/2006/main">
+  <p:cSld>
+    <p:spTree>
+      <p:nvGrpSpPr>
+        <p:cNvPr id="1" name=""/>
+        <p:cNvGrpSpPr/>
+        <p:nvPr/>
+      </p:nvGrpSpPr>
+      <p:grpSpPr>
+        <a:xfrm>
+          <a:off x="0" y="0"/>
+          <a:ext cx="0" cy="0"/>
+          <a:chOff x="0" y="0"/>
+          <a:chExt cx="0" cy="0"/>
+        </a:xfrm>
+      </p:grpSpPr>
+      <p:sp>
+        <p:nvSpPr>
+          <p:cNvPr id="2" name="Slide Image Placeholder 1"/>
+          <p:cNvSpPr>
+            <a:spLocks noGrp="1" noRot="1" noChangeAspect="1"/>
+          </p:cNvSpPr>
+          <p:nvPr>
+            <p:ph type="sldImg"/>
+          </p:nvPr>
+        </p:nvSpPr>
+        <p:spPr/>
+      </p:sp>
+      <p:sp>
+        <p:nvSpPr>
+          <p:cNvPr id="3" name="Notes Placeholder 2"/>
+          <p:cNvSpPr>
+            <a:spLocks noGrp="1"/>
+          </p:cNvSpPr>
+          <p:nvPr>
+            <p:ph type="body" idx="1"/>
+          </p:nvPr>
+        </p:nvSpPr>
+        <p:spPr/>
+        <p:txBody>
+          <a:bodyPr/>
+          <a:lstStyle/>
+          <a:p>
+            <a:r>
+              <a:rPr lang="en-US" dirty="0"/>
+              <a:t>Sometimes when you break this down by plot you find that post switch </a:t>
+            </a:r>
+            <a:r>
+              <a:rPr lang="en-US" dirty="0" err="1"/>
+              <a:t>tinygran</a:t>
+            </a:r>
+            <a:r>
+              <a:rPr lang="en-US" dirty="0"/>
+              <a:t> e on EE, and </a:t>
+            </a:r>
+            <a:r>
+              <a:rPr lang="en-US" dirty="0" err="1"/>
+              <a:t>esp</a:t>
+            </a:r>
+            <a:r>
+              <a:rPr lang="en-US" dirty="0"/>
+              <a:t> CE, exceeds controls. But not by as much as in the beginning. </a:t>
+            </a:r>
+          </a:p>
+        </p:txBody>
+      </p:sp>
+      <p:sp>
+        <p:nvSpPr>
+          <p:cNvPr id="4" name="Slide Number Placeholder 3"/>
+          <p:cNvSpPr>
+            <a:spLocks noGrp="1"/>
+          </p:cNvSpPr>
+          <p:nvPr>
+            <p:ph type="sldNum" sz="quarter" idx="5"/>
+          </p:nvPr>
+        </p:nvSpPr>
+        <p:spPr/>
+        <p:txBody>
+          <a:bodyPr/>
+          <a:lstStyle/>
+          <a:p>
+            <a:fld id="{3F921DDA-A758-574A-A337-2D92A6B35225}" type="slidenum">
+              <a:rPr lang="en-US" smtClean="0"/>
+              <a:t>13</a:t>
+            </a:fld>
+            <a:endParaRPr lang="en-US"/>
+          </a:p>
+        </p:txBody>
+      </p:sp>
+    </p:spTree>
+    <p:extLst>
+      <p:ext uri="{BB962C8B-B14F-4D97-AF65-F5344CB8AC3E}">
+        <p14:creationId xmlns:p14="http://schemas.microsoft.com/office/powerpoint/2010/main" val="3803328506"/>
+      </p:ext>
+    </p:extLst>
+  </p:cSld>
+  <p:clrMapOvr>
+    <a:masterClrMapping/>
+  </p:clrMapOvr>
+</p:notes>
+</file>
+
+<file path=ppt/notesSlides/notesSlide5.xml><?xml version="1.0" encoding="utf-8"?>
+<p:notes xmlns:a="http://schemas.openxmlformats.org/drawingml/2006/main" xmlns:r="http://schemas.openxmlformats.org/officeDocument/2006/relationships" xmlns:p="http://schemas.openxmlformats.org/presentationml/2006/main">
+  <p:cSld>
+    <p:spTree>
+      <p:nvGrpSpPr>
+        <p:cNvPr id="1" name=""/>
+        <p:cNvGrpSpPr/>
+        <p:nvPr/>
+      </p:nvGrpSpPr>
+      <p:grpSpPr>
+        <a:xfrm>
+          <a:off x="0" y="0"/>
+          <a:ext cx="0" cy="0"/>
+          <a:chOff x="0" y="0"/>
+          <a:chExt cx="0" cy="0"/>
+        </a:xfrm>
+      </p:grpSpPr>
+      <p:sp>
+        <p:nvSpPr>
+          <p:cNvPr id="2" name="Slide Image Placeholder 1"/>
+          <p:cNvSpPr>
+            <a:spLocks noGrp="1" noRot="1" noChangeAspect="1"/>
+          </p:cNvSpPr>
+          <p:nvPr>
+            <p:ph type="sldImg"/>
+          </p:nvPr>
+        </p:nvSpPr>
+        <p:spPr/>
+      </p:sp>
+      <p:sp>
+        <p:nvSpPr>
+          <p:cNvPr id="3" name="Notes Placeholder 2"/>
+          <p:cNvSpPr>
+            <a:spLocks noGrp="1"/>
+          </p:cNvSpPr>
+          <p:nvPr>
+            <p:ph type="body" idx="1"/>
+          </p:nvPr>
+        </p:nvSpPr>
+        <p:spPr/>
+        <p:txBody>
+          <a:bodyPr/>
+          <a:lstStyle/>
+          <a:p>
+            <a:r>
+              <a:rPr lang="en-US" dirty="0"/>
+              <a:t>I think you get fuzz around the since the 90s thing.</a:t>
+            </a:r>
+          </a:p>
+        </p:txBody>
+      </p:sp>
+      <p:sp>
+        <p:nvSpPr>
+          <p:cNvPr id="4" name="Slide Number Placeholder 3"/>
+          <p:cNvSpPr>
+            <a:spLocks noGrp="1"/>
+          </p:cNvSpPr>
+          <p:nvPr>
+            <p:ph type="sldNum" sz="quarter" idx="5"/>
+          </p:nvPr>
+        </p:nvSpPr>
+        <p:spPr/>
+        <p:txBody>
+          <a:bodyPr/>
+          <a:lstStyle/>
+          <a:p>
+            <a:fld id="{3F921DDA-A758-574A-A337-2D92A6B35225}" type="slidenum">
+              <a:rPr lang="en-US" smtClean="0"/>
+              <a:t>16</a:t>
+            </a:fld>
+            <a:endParaRPr lang="en-US"/>
+          </a:p>
+        </p:txBody>
+      </p:sp>
+    </p:spTree>
+    <p:extLst>
+      <p:ext uri="{BB962C8B-B14F-4D97-AF65-F5344CB8AC3E}">
+        <p14:creationId xmlns:p14="http://schemas.microsoft.com/office/powerpoint/2010/main" val="3187728415"/>
+      </p:ext>
+    </p:extLst>
+  </p:cSld>
+  <p:clrMapOvr>
+    <a:masterClrMapping/>
+  </p:clrMapOvr>
+</p:notes>
+</file>
+
 <file path=ppt/slideLayouts/slideLayout1.xml><?xml version="1.0" encoding="utf-8"?>
 <p:sldLayout xmlns:a="http://schemas.openxmlformats.org/drawingml/2006/main" xmlns:r="http://schemas.openxmlformats.org/officeDocument/2006/relationships" xmlns:p="http://schemas.openxmlformats.org/presentationml/2006/main" type="title" preserve="1">
   <p:cSld name="Title Slide">
@@ -934,7 +1124,7 @@
           <a:p>
             <a:fld id="{57A19376-5358-6B4F-81C8-7F7BE978C611}" type="datetimeFigureOut">
               <a:rPr lang="en-US" smtClean="0"/>
-              <a:t>2/2/21</a:t>
+              <a:t>2/11/21</a:t>
             </a:fld>
             <a:endParaRPr lang="en-US"/>
           </a:p>
@@ -1164,7 +1354,7 @@
           <a:p>
             <a:fld id="{57A19376-5358-6B4F-81C8-7F7BE978C611}" type="datetimeFigureOut">
               <a:rPr lang="en-US" smtClean="0"/>
-              <a:t>2/2/21</a:t>
+              <a:t>2/11/21</a:t>
             </a:fld>
             <a:endParaRPr lang="en-US"/>
           </a:p>
@@ -1399,7 +1589,7 @@
           <a:p>
             <a:fld id="{57A19376-5358-6B4F-81C8-7F7BE978C611}" type="datetimeFigureOut">
               <a:rPr lang="en-US" smtClean="0"/>
-              <a:t>2/2/21</a:t>
+              <a:t>2/11/21</a:t>
             </a:fld>
             <a:endParaRPr lang="en-US"/>
           </a:p>
@@ -1636,7 +1826,7 @@
           <a:p>
             <a:fld id="{57A19376-5358-6B4F-81C8-7F7BE978C611}" type="datetimeFigureOut">
               <a:rPr lang="en-US" smtClean="0"/>
-              <a:t>2/2/21</a:t>
+              <a:t>2/11/21</a:t>
             </a:fld>
             <a:endParaRPr lang="en-US"/>
           </a:p>
@@ -1938,7 +2128,7 @@
           <a:p>
             <a:fld id="{57A19376-5358-6B4F-81C8-7F7BE978C611}" type="datetimeFigureOut">
               <a:rPr lang="en-US" smtClean="0"/>
-              <a:t>2/2/21</a:t>
+              <a:t>2/11/21</a:t>
             </a:fld>
             <a:endParaRPr lang="en-US"/>
           </a:p>
@@ -2235,7 +2425,7 @@
           <a:p>
             <a:fld id="{57A19376-5358-6B4F-81C8-7F7BE978C611}" type="datetimeFigureOut">
               <a:rPr lang="en-US" smtClean="0"/>
-              <a:t>2/2/21</a:t>
+              <a:t>2/11/21</a:t>
             </a:fld>
             <a:endParaRPr lang="en-US"/>
           </a:p>
@@ -2674,7 +2864,7 @@
           <a:p>
             <a:fld id="{57A19376-5358-6B4F-81C8-7F7BE978C611}" type="datetimeFigureOut">
               <a:rPr lang="en-US" smtClean="0"/>
-              <a:t>2/2/21</a:t>
+              <a:t>2/11/21</a:t>
             </a:fld>
             <a:endParaRPr lang="en-US"/>
           </a:p>
@@ -2847,7 +3037,7 @@
           <a:p>
             <a:fld id="{57A19376-5358-6B4F-81C8-7F7BE978C611}" type="datetimeFigureOut">
               <a:rPr lang="en-US" smtClean="0"/>
-              <a:t>2/2/21</a:t>
+              <a:t>2/11/21</a:t>
             </a:fld>
             <a:endParaRPr lang="en-US"/>
           </a:p>
@@ -2984,7 +3174,7 @@
           <a:p>
             <a:fld id="{57A19376-5358-6B4F-81C8-7F7BE978C611}" type="datetimeFigureOut">
               <a:rPr lang="en-US" smtClean="0"/>
-              <a:t>2/2/21</a:t>
+              <a:t>2/11/21</a:t>
             </a:fld>
             <a:endParaRPr lang="en-US"/>
           </a:p>
@@ -3322,7 +3512,7 @@
           <a:p>
             <a:fld id="{57A19376-5358-6B4F-81C8-7F7BE978C611}" type="datetimeFigureOut">
               <a:rPr lang="en-US" smtClean="0"/>
-              <a:t>2/2/21</a:t>
+              <a:t>2/11/21</a:t>
             </a:fld>
             <a:endParaRPr lang="en-US"/>
           </a:p>
@@ -3637,7 +3827,7 @@
           <a:p>
             <a:fld id="{57A19376-5358-6B4F-81C8-7F7BE978C611}" type="datetimeFigureOut">
               <a:rPr lang="en-US" smtClean="0"/>
-              <a:t>2/2/21</a:t>
+              <a:t>2/11/21</a:t>
             </a:fld>
             <a:endParaRPr lang="en-US"/>
           </a:p>
@@ -4849,7 +5039,7 @@
           <p:nvPr/>
         </p:nvPicPr>
         <p:blipFill>
-          <a:blip r:embed="rId2"/>
+          <a:blip r:embed="rId3"/>
           <a:srcRect/>
           <a:stretch/>
         </p:blipFill>
@@ -5358,7 +5548,7 @@
           </p:nvPr>
         </p:nvPicPr>
         <p:blipFill>
-          <a:blip r:embed="rId2"/>
+          <a:blip r:embed="rId3"/>
           <a:srcRect/>
           <a:stretch/>
         </p:blipFill>
@@ -5458,7 +5648,7 @@
           <p:nvPr/>
         </p:nvPicPr>
         <p:blipFill>
-          <a:blip r:embed="rId3"/>
+          <a:blip r:embed="rId4"/>
           <a:srcRect/>
           <a:stretch/>
         </p:blipFill>

</xml_diff>

<commit_message>
unnatrual things with gams
</commit_message>
<xml_diff>
--- a/scaffold/old/talk_feb_2.pptx
+++ b/scaffold/old/talk_feb_2.pptx
@@ -216,7 +216,7 @@
           <a:p>
             <a:fld id="{1B8AC848-6CEE-0744-AFE6-E0701C96A024}" type="datetimeFigureOut">
               <a:rPr lang="en-US" smtClean="0"/>
-              <a:t>2/11/21</a:t>
+              <a:t>2/16/21</a:t>
             </a:fld>
             <a:endParaRPr lang="en-US"/>
           </a:p>
@@ -1124,7 +1124,7 @@
           <a:p>
             <a:fld id="{57A19376-5358-6B4F-81C8-7F7BE978C611}" type="datetimeFigureOut">
               <a:rPr lang="en-US" smtClean="0"/>
-              <a:t>2/11/21</a:t>
+              <a:t>2/16/21</a:t>
             </a:fld>
             <a:endParaRPr lang="en-US"/>
           </a:p>
@@ -1354,7 +1354,7 @@
           <a:p>
             <a:fld id="{57A19376-5358-6B4F-81C8-7F7BE978C611}" type="datetimeFigureOut">
               <a:rPr lang="en-US" smtClean="0"/>
-              <a:t>2/11/21</a:t>
+              <a:t>2/16/21</a:t>
             </a:fld>
             <a:endParaRPr lang="en-US"/>
           </a:p>
@@ -1589,7 +1589,7 @@
           <a:p>
             <a:fld id="{57A19376-5358-6B4F-81C8-7F7BE978C611}" type="datetimeFigureOut">
               <a:rPr lang="en-US" smtClean="0"/>
-              <a:t>2/11/21</a:t>
+              <a:t>2/16/21</a:t>
             </a:fld>
             <a:endParaRPr lang="en-US"/>
           </a:p>
@@ -1826,7 +1826,7 @@
           <a:p>
             <a:fld id="{57A19376-5358-6B4F-81C8-7F7BE978C611}" type="datetimeFigureOut">
               <a:rPr lang="en-US" smtClean="0"/>
-              <a:t>2/11/21</a:t>
+              <a:t>2/16/21</a:t>
             </a:fld>
             <a:endParaRPr lang="en-US"/>
           </a:p>
@@ -2128,7 +2128,7 @@
           <a:p>
             <a:fld id="{57A19376-5358-6B4F-81C8-7F7BE978C611}" type="datetimeFigureOut">
               <a:rPr lang="en-US" smtClean="0"/>
-              <a:t>2/11/21</a:t>
+              <a:t>2/16/21</a:t>
             </a:fld>
             <a:endParaRPr lang="en-US"/>
           </a:p>
@@ -2425,7 +2425,7 @@
           <a:p>
             <a:fld id="{57A19376-5358-6B4F-81C8-7F7BE978C611}" type="datetimeFigureOut">
               <a:rPr lang="en-US" smtClean="0"/>
-              <a:t>2/11/21</a:t>
+              <a:t>2/16/21</a:t>
             </a:fld>
             <a:endParaRPr lang="en-US"/>
           </a:p>
@@ -2864,7 +2864,7 @@
           <a:p>
             <a:fld id="{57A19376-5358-6B4F-81C8-7F7BE978C611}" type="datetimeFigureOut">
               <a:rPr lang="en-US" smtClean="0"/>
-              <a:t>2/11/21</a:t>
+              <a:t>2/16/21</a:t>
             </a:fld>
             <a:endParaRPr lang="en-US"/>
           </a:p>
@@ -3037,7 +3037,7 @@
           <a:p>
             <a:fld id="{57A19376-5358-6B4F-81C8-7F7BE978C611}" type="datetimeFigureOut">
               <a:rPr lang="en-US" smtClean="0"/>
-              <a:t>2/11/21</a:t>
+              <a:t>2/16/21</a:t>
             </a:fld>
             <a:endParaRPr lang="en-US"/>
           </a:p>
@@ -3174,7 +3174,7 @@
           <a:p>
             <a:fld id="{57A19376-5358-6B4F-81C8-7F7BE978C611}" type="datetimeFigureOut">
               <a:rPr lang="en-US" smtClean="0"/>
-              <a:t>2/11/21</a:t>
+              <a:t>2/16/21</a:t>
             </a:fld>
             <a:endParaRPr lang="en-US"/>
           </a:p>
@@ -3512,7 +3512,7 @@
           <a:p>
             <a:fld id="{57A19376-5358-6B4F-81C8-7F7BE978C611}" type="datetimeFigureOut">
               <a:rPr lang="en-US" smtClean="0"/>
-              <a:t>2/11/21</a:t>
+              <a:t>2/16/21</a:t>
             </a:fld>
             <a:endParaRPr lang="en-US"/>
           </a:p>
@@ -3827,7 +3827,7 @@
           <a:p>
             <a:fld id="{57A19376-5358-6B4F-81C8-7F7BE978C611}" type="datetimeFigureOut">
               <a:rPr lang="en-US" smtClean="0"/>
-              <a:t>2/11/21</a:t>
+              <a:t>2/16/21</a:t>
             </a:fld>
             <a:endParaRPr lang="en-US"/>
           </a:p>
@@ -4558,7 +4558,7 @@
       </p:sp>
       <p:pic>
         <p:nvPicPr>
-          <p:cNvPr id="7" name="Content Placeholder 6" descr="Chart, line chart&#10;&#10;Description automatically generated">
+          <p:cNvPr id="7" name="Content Placeholder 6">
             <a:extLst>
               <a:ext uri="{FF2B5EF4-FFF2-40B4-BE49-F238E27FC236}">
                 <a16:creationId xmlns:a16="http://schemas.microsoft.com/office/drawing/2014/main" id="{7E1FC14C-E8F5-4C42-A09A-D861393913CD}"/>
@@ -4574,14 +4574,13 @@
         </p:nvPicPr>
         <p:blipFill>
           <a:blip r:embed="rId2"/>
-          <a:stretch>
-            <a:fillRect/>
-          </a:stretch>
+          <a:srcRect/>
+          <a:stretch/>
         </p:blipFill>
         <p:spPr>
           <a:xfrm>
-            <a:off x="762001" y="2276840"/>
-            <a:ext cx="5772818" cy="2474064"/>
+            <a:off x="762002" y="2276840"/>
+            <a:ext cx="5772816" cy="2474064"/>
           </a:xfrm>
         </p:spPr>
       </p:pic>
@@ -4633,7 +4632,7 @@
           <a:p>
             <a:r>
               <a:rPr lang="en-US" dirty="0"/>
-              <a:t>Increasing discrepancy since 2010, approaching the discrepancy seen in the early 1970s.</a:t>
+              <a:t>Increasing discrepancy since 2010</a:t>
             </a:r>
           </a:p>
           <a:p>
@@ -4817,7 +4816,7 @@
       </p:sp>
       <p:pic>
         <p:nvPicPr>
-          <p:cNvPr id="4" name="Picture 3" descr="Chart, line chart&#10;&#10;Description automatically generated">
+          <p:cNvPr id="4" name="Picture 3">
             <a:extLst>
               <a:ext uri="{FF2B5EF4-FFF2-40B4-BE49-F238E27FC236}">
                 <a16:creationId xmlns:a16="http://schemas.microsoft.com/office/drawing/2014/main" id="{FBA5BB38-19EC-E14C-92D6-DDA540100FCE}"/>
@@ -4831,14 +4830,13 @@
         </p:nvPicPr>
         <p:blipFill>
           <a:blip r:embed="rId2"/>
-          <a:stretch>
-            <a:fillRect/>
-          </a:stretch>
+          <a:srcRect/>
+          <a:stretch/>
         </p:blipFill>
         <p:spPr>
           <a:xfrm>
             <a:off x="602974" y="2208123"/>
-            <a:ext cx="6350600" cy="2721686"/>
+            <a:ext cx="6350600" cy="2721685"/>
           </a:xfrm>
           <a:prstGeom prst="rect">
             <a:avLst/>
@@ -5045,67 +5043,14 @@
         </p:blipFill>
         <p:spPr>
           <a:xfrm>
-            <a:off x="602974" y="2208123"/>
-            <a:ext cx="6350600" cy="2721685"/>
+            <a:off x="602975" y="2208123"/>
+            <a:ext cx="6350598" cy="2721685"/>
           </a:xfrm>
           <a:prstGeom prst="rect">
             <a:avLst/>
           </a:prstGeom>
         </p:spPr>
       </p:pic>
-      <p:sp>
-        <p:nvSpPr>
-          <p:cNvPr id="6" name="TextBox 5">
-            <a:extLst>
-              <a:ext uri="{FF2B5EF4-FFF2-40B4-BE49-F238E27FC236}">
-                <a16:creationId xmlns:a16="http://schemas.microsoft.com/office/drawing/2014/main" id="{84BDCB88-89BB-8A47-B4AE-CB4EF627E774}"/>
-              </a:ext>
-            </a:extLst>
-          </p:cNvPr>
-          <p:cNvSpPr txBox="1"/>
-          <p:nvPr/>
-        </p:nvSpPr>
-        <p:spPr>
-          <a:xfrm>
-            <a:off x="838200" y="5337056"/>
-            <a:ext cx="4786888" cy="738664"/>
-          </a:xfrm>
-          <a:prstGeom prst="rect">
-            <a:avLst/>
-          </a:prstGeom>
-          <a:noFill/>
-        </p:spPr>
-        <p:txBody>
-          <a:bodyPr wrap="none" rtlCol="0">
-            <a:spAutoFit/>
-          </a:bodyPr>
-          <a:lstStyle/>
-          <a:p>
-            <a:r>
-              <a:rPr lang="en-US" sz="1400" dirty="0">
-                <a:latin typeface="Helvetica Light" panose="020B0403020202020204" pitchFamily="34" charset="0"/>
-              </a:rPr>
-              <a:t>Horizontal line is 1</a:t>
-            </a:r>
-          </a:p>
-          <a:p>
-            <a:r>
-              <a:rPr lang="en-US" sz="1400" dirty="0">
-                <a:latin typeface="Helvetica Light" panose="020B0403020202020204" pitchFamily="34" charset="0"/>
-              </a:rPr>
-              <a:t>Red is where GAM smooths overlap</a:t>
-            </a:r>
-          </a:p>
-          <a:p>
-            <a:r>
-              <a:rPr lang="en-US" sz="1400" dirty="0">
-                <a:latin typeface="Helvetica Light" panose="020B0403020202020204" pitchFamily="34" charset="0"/>
-              </a:rPr>
-              <a:t>GLS and GLM: No significant treatment effect in b, c, or d</a:t>
-            </a:r>
-          </a:p>
-        </p:txBody>
-      </p:sp>
     </p:spTree>
     <p:extLst>
       <p:ext uri="{BB962C8B-B14F-4D97-AF65-F5344CB8AC3E}">
@@ -5249,7 +5194,7 @@
       </p:sp>
       <p:pic>
         <p:nvPicPr>
-          <p:cNvPr id="7" name="Content Placeholder 6" descr="Chart, line chart&#10;&#10;Description automatically generated">
+          <p:cNvPr id="7" name="Content Placeholder 6">
             <a:extLst>
               <a:ext uri="{FF2B5EF4-FFF2-40B4-BE49-F238E27FC236}">
                 <a16:creationId xmlns:a16="http://schemas.microsoft.com/office/drawing/2014/main" id="{25C3B00B-067B-5947-999B-F6ECA5DD8E00}"/>
@@ -5265,20 +5210,19 @@
         </p:nvPicPr>
         <p:blipFill>
           <a:blip r:embed="rId2"/>
-          <a:stretch>
-            <a:fillRect/>
-          </a:stretch>
+          <a:srcRect/>
+          <a:stretch/>
         </p:blipFill>
         <p:spPr>
           <a:xfrm>
-            <a:off x="602974" y="229379"/>
-            <a:ext cx="5022114" cy="2152334"/>
+            <a:off x="602975" y="229379"/>
+            <a:ext cx="5022112" cy="2152334"/>
           </a:xfrm>
         </p:spPr>
       </p:pic>
       <p:pic>
         <p:nvPicPr>
-          <p:cNvPr id="8" name="Picture 7" descr="Chart, line chart&#10;&#10;Description automatically generated">
+          <p:cNvPr id="8" name="Picture 7">
             <a:extLst>
               <a:ext uri="{FF2B5EF4-FFF2-40B4-BE49-F238E27FC236}">
                 <a16:creationId xmlns:a16="http://schemas.microsoft.com/office/drawing/2014/main" id="{B2DABF20-330C-CC48-995F-95D3B3BDB477}"/>
@@ -5292,14 +5236,13 @@
         </p:nvPicPr>
         <p:blipFill>
           <a:blip r:embed="rId3"/>
-          <a:stretch>
-            <a:fillRect/>
-          </a:stretch>
+          <a:srcRect/>
+          <a:stretch/>
         </p:blipFill>
         <p:spPr>
           <a:xfrm>
             <a:off x="602974" y="2208123"/>
-            <a:ext cx="5022112" cy="2152334"/>
+            <a:ext cx="5022112" cy="2152333"/>
           </a:xfrm>
           <a:prstGeom prst="rect">
             <a:avLst/>
@@ -5328,7 +5271,7 @@
         <p:spPr>
           <a:xfrm>
             <a:off x="602974" y="4136315"/>
-            <a:ext cx="5022116" cy="2152335"/>
+            <a:ext cx="5022115" cy="2152335"/>
           </a:xfrm>
           <a:prstGeom prst="rect">
             <a:avLst/>
@@ -5392,7 +5335,7 @@
       </p:sp>
       <p:pic>
         <p:nvPicPr>
-          <p:cNvPr id="6" name="Content Placeholder 5" descr="Chart&#10;&#10;Description automatically generated">
+          <p:cNvPr id="6" name="Content Placeholder 5">
             <a:extLst>
               <a:ext uri="{FF2B5EF4-FFF2-40B4-BE49-F238E27FC236}">
                 <a16:creationId xmlns:a16="http://schemas.microsoft.com/office/drawing/2014/main" id="{27ABE16B-F714-FB49-B372-F6E75F113203}"/>
@@ -5408,14 +5351,13 @@
         </p:nvPicPr>
         <p:blipFill>
           <a:blip r:embed="rId2"/>
-          <a:stretch>
-            <a:fillRect/>
-          </a:stretch>
+          <a:srcRect/>
+          <a:stretch/>
         </p:blipFill>
         <p:spPr>
           <a:xfrm>
-            <a:off x="838200" y="2890951"/>
-            <a:ext cx="5181600" cy="2220685"/>
+            <a:off x="838201" y="2890951"/>
+            <a:ext cx="5181598" cy="2220685"/>
           </a:xfrm>
         </p:spPr>
       </p:pic>
@@ -5465,13 +5407,6 @@
             <a:r>
               <a:rPr lang="en-US" dirty="0"/>
               <a:t> exclosures following 2015</a:t>
-            </a:r>
-          </a:p>
-          <a:p>
-            <a:pPr lvl="1"/>
-            <a:r>
-              <a:rPr lang="en-US" dirty="0"/>
-              <a:t>GLS finds no sig. diff, GLM finds p=0.04</a:t>
             </a:r>
           </a:p>
         </p:txBody>
@@ -5555,7 +5490,7 @@
         <p:spPr>
           <a:xfrm>
             <a:off x="914402" y="1690688"/>
-            <a:ext cx="5181598" cy="2220685"/>
+            <a:ext cx="5181598" cy="2220684"/>
           </a:xfrm>
         </p:spPr>
       </p:pic>
@@ -5583,28 +5518,13 @@
         </p:spPr>
         <p:txBody>
           <a:bodyPr>
-            <a:normAutofit fontScale="85000" lnSpcReduction="10000"/>
+            <a:normAutofit lnSpcReduction="10000"/>
           </a:bodyPr>
           <a:lstStyle/>
           <a:p>
             <a:r>
               <a:rPr lang="en-US" dirty="0"/>
               <a:t>Small granivores on new exclosures v. control (top), and old exclosures v. new (bottom).</a:t>
-            </a:r>
-          </a:p>
-          <a:p>
-            <a:pPr lvl="1"/>
-            <a:r>
-              <a:rPr lang="en-US" dirty="0"/>
-              <a:t>GLS finds no sig diff between any treatments in c or d; GLM finds sig diff between new and controls in d, but not between new and </a:t>
-            </a:r>
-            <a:r>
-              <a:rPr lang="en-US" dirty="0" err="1"/>
-              <a:t>longterm</a:t>
-            </a:r>
-            <a:r>
-              <a:rPr lang="en-US" dirty="0"/>
-              <a:t>.</a:t>
             </a:r>
           </a:p>
           <a:p>
@@ -5654,8 +5574,8 @@
         </p:blipFill>
         <p:spPr>
           <a:xfrm>
-            <a:off x="914402" y="3911373"/>
-            <a:ext cx="5181598" cy="2220684"/>
+            <a:off x="914403" y="3911373"/>
+            <a:ext cx="5181596" cy="2220684"/>
           </a:xfrm>
           <a:prstGeom prst="rect">
             <a:avLst/>
@@ -5740,8 +5660,8 @@
         </p:blipFill>
         <p:spPr>
           <a:xfrm>
-            <a:off x="914402" y="1690688"/>
-            <a:ext cx="5181598" cy="2220684"/>
+            <a:off x="914403" y="1690688"/>
+            <a:ext cx="5181596" cy="2220684"/>
           </a:xfrm>
         </p:spPr>
       </p:pic>
@@ -5776,12 +5696,6 @@
             <a:r>
               <a:rPr lang="en-US" dirty="0"/>
               <a:t>GLS and GLM find no sig diff between any treatments in b, c, or d</a:t>
-            </a:r>
-          </a:p>
-          <a:p>
-            <a:r>
-              <a:rPr lang="en-US" dirty="0"/>
-              <a:t>The higher small granivore energy use on new exclosures is mostly PB.</a:t>
             </a:r>
           </a:p>
           <a:p>

</xml_diff>